<commit_message>
[R-B-01] Fix color coding
Purple had the wrong RGB value, no wonder it didn't show properly.
</commit_message>
<xml_diff>
--- a/rust-beginner/01 - Installation/01 - original.pptx
+++ b/rust-beginner/01 - Installation/01 - original.pptx
@@ -381,7 +381,7 @@
           <a:p>
             <a:fld id="{066FE93B-C0A8-431F-AA2F-BF32D1BA0DA9}" type="datetimeFigureOut">
               <a:rPr lang="de-DE" smtClean="0"/>
-              <a:t>21.04.2024</a:t>
+              <a:t>01.05.2024</a:t>
             </a:fld>
             <a:endParaRPr lang="de-DE"/>
           </a:p>
@@ -1387,7 +1387,7 @@
           <a:p>
             <a:fld id="{1B86CF29-98CB-41A0-9533-1F69A7269E4E}" type="datetime1">
               <a:rPr lang="de-DE" smtClean="0"/>
-              <a:t>21.04.2024</a:t>
+              <a:t>01.05.2024</a:t>
             </a:fld>
             <a:endParaRPr lang="de-DE"/>
           </a:p>
@@ -2611,7 +2611,7 @@
           <a:p>
             <a:fld id="{A47C6873-5FFD-4CA3-B601-12EDA11E7384}" type="datetime1">
               <a:rPr lang="de-DE" smtClean="0"/>
-              <a:t>21.04.2024</a:t>
+              <a:t>01.05.2024</a:t>
             </a:fld>
             <a:endParaRPr lang="de-DE"/>
           </a:p>
@@ -2768,7 +2768,7 @@
           <a:p>
             <a:fld id="{97C84E54-DB5C-4EF4-8C00-D9DC9CF4CB03}" type="datetime1">
               <a:rPr lang="de-DE" smtClean="0"/>
-              <a:t>21.04.2024</a:t>
+              <a:t>01.05.2024</a:t>
             </a:fld>
             <a:endParaRPr lang="de-DE"/>
           </a:p>
@@ -3861,7 +3861,7 @@
           <a:p>
             <a:fld id="{F110A31F-3378-4745-A8AD-87E81814308C}" type="datetime1">
               <a:rPr lang="de-DE" smtClean="0"/>
-              <a:t>21.04.2024</a:t>
+              <a:t>01.05.2024</a:t>
             </a:fld>
             <a:endParaRPr lang="de-DE"/>
           </a:p>
@@ -4383,7 +4383,7 @@
           <a:p>
             <a:fld id="{3C5A5924-177F-4E13-8F18-BF17D897E27B}" type="datetime1">
               <a:rPr lang="de-DE" smtClean="0"/>
-              <a:t>21.04.2024</a:t>
+              <a:t>01.05.2024</a:t>
             </a:fld>
             <a:endParaRPr lang="de-DE"/>
           </a:p>
@@ -5038,7 +5038,7 @@
           <a:p>
             <a:fld id="{C02F5A9B-9FF8-41D7-88D9-F781DB264A7C}" type="datetime1">
               <a:rPr lang="de-DE" smtClean="0"/>
-              <a:t>21.04.2024</a:t>
+              <a:t>01.05.2024</a:t>
             </a:fld>
             <a:endParaRPr lang="de-DE"/>
           </a:p>
@@ -5427,7 +5427,7 @@
           <a:p>
             <a:fld id="{3156570E-7EF3-4182-BA9D-2A52B45C241A}" type="datetime1">
               <a:rPr lang="de-DE" smtClean="0"/>
-              <a:t>21.04.2024</a:t>
+              <a:t>01.05.2024</a:t>
             </a:fld>
             <a:endParaRPr lang="de-DE"/>
           </a:p>
@@ -5949,7 +5949,7 @@
           <a:p>
             <a:fld id="{F7C1F0D2-5185-4D31-AB2C-73B275E057D2}" type="datetime1">
               <a:rPr lang="de-DE" smtClean="0"/>
-              <a:t>21.04.2024</a:t>
+              <a:t>01.05.2024</a:t>
             </a:fld>
             <a:endParaRPr lang="de-DE"/>
           </a:p>
@@ -7042,7 +7042,7 @@
           <a:p>
             <a:fld id="{D1D978B3-F0C5-4ABC-A255-F5F0962A8D8B}" type="datetime1">
               <a:rPr lang="de-DE" smtClean="0"/>
-              <a:t>21.04.2024</a:t>
+              <a:t>01.05.2024</a:t>
             </a:fld>
             <a:endParaRPr lang="de-DE"/>
           </a:p>
@@ -7724,7 +7724,7 @@
           <a:p>
             <a:fld id="{D8799C66-E9C7-4A80-B57A-E25F3C3939CD}" type="datetime1">
               <a:rPr lang="de-DE" smtClean="0"/>
-              <a:t>21.04.2024</a:t>
+              <a:t>01.05.2024</a:t>
             </a:fld>
             <a:endParaRPr lang="de-DE"/>
           </a:p>
@@ -8032,7 +8032,7 @@
           <a:p>
             <a:fld id="{A986101B-8F49-41C6-B566-F6D80346D6C1}" type="datetime1">
               <a:rPr lang="de-DE" smtClean="0"/>
-              <a:t>21.04.2024</a:t>
+              <a:t>01.05.2024</a:t>
             </a:fld>
             <a:endParaRPr lang="de-DE"/>
           </a:p>
@@ -8800,7 +8800,7 @@
           <a:p>
             <a:fld id="{872B7197-EDBB-45FE-B01B-7EF51F589382}" type="datetime1">
               <a:rPr lang="de-DE" smtClean="0"/>
-              <a:t>21.04.2024</a:t>
+              <a:t>01.05.2024</a:t>
             </a:fld>
             <a:endParaRPr lang="de-DE"/>
           </a:p>
@@ -9784,7 +9784,7 @@
           <a:p>
             <a:fld id="{3C5A5924-177F-4E13-8F18-BF17D897E27B}" type="datetime1">
               <a:rPr lang="de-DE" smtClean="0"/>
-              <a:t>21.04.2024</a:t>
+              <a:t>01.05.2024</a:t>
             </a:fld>
             <a:endParaRPr lang="de-DE"/>
           </a:p>
@@ -9940,7 +9940,7 @@
           <a:p>
             <a:fld id="{3C5A5924-177F-4E13-8F18-BF17D897E27B}" type="datetime1">
               <a:rPr lang="de-DE" smtClean="0"/>
-              <a:t>21.04.2024</a:t>
+              <a:t>01.05.2024</a:t>
             </a:fld>
             <a:endParaRPr lang="de-DE"/>
           </a:p>
@@ -10109,7 +10109,7 @@
           <a:p>
             <a:fld id="{3C5A5924-177F-4E13-8F18-BF17D897E27B}" type="datetime1">
               <a:rPr lang="de-DE" smtClean="0"/>
-              <a:t>21.04.2024</a:t>
+              <a:t>01.05.2024</a:t>
             </a:fld>
             <a:endParaRPr lang="de-DE"/>
           </a:p>
@@ -10356,7 +10356,7 @@
           <a:p>
             <a:fld id="{3C5A5924-177F-4E13-8F18-BF17D897E27B}" type="datetime1">
               <a:rPr lang="de-DE" smtClean="0"/>
-              <a:t>21.04.2024</a:t>
+              <a:t>01.05.2024</a:t>
             </a:fld>
             <a:endParaRPr lang="de-DE"/>
           </a:p>
@@ -10591,7 +10591,7 @@
           <a:p>
             <a:fld id="{3C5A5924-177F-4E13-8F18-BF17D897E27B}" type="datetime1">
               <a:rPr lang="de-DE" smtClean="0"/>
-              <a:t>21.04.2024</a:t>
+              <a:t>01.05.2024</a:t>
             </a:fld>
             <a:endParaRPr lang="de-DE"/>
           </a:p>
@@ -10767,7 +10767,7 @@
           <a:p>
             <a:fld id="{3C5A5924-177F-4E13-8F18-BF17D897E27B}" type="datetime1">
               <a:rPr lang="de-DE" smtClean="0"/>
-              <a:t>21.04.2024</a:t>
+              <a:t>01.05.2024</a:t>
             </a:fld>
             <a:endParaRPr lang="de-DE"/>
           </a:p>
@@ -10990,7 +10990,7 @@
           <a:p>
             <a:fld id="{3C5A5924-177F-4E13-8F18-BF17D897E27B}" type="datetime1">
               <a:rPr lang="de-DE" smtClean="0"/>
-              <a:t>21.04.2024</a:t>
+              <a:t>01.05.2024</a:t>
             </a:fld>
             <a:endParaRPr lang="de-DE"/>
           </a:p>
@@ -11242,7 +11242,7 @@
           <a:p>
             <a:fld id="{3C5A5924-177F-4E13-8F18-BF17D897E27B}" type="datetime1">
               <a:rPr lang="de-DE" smtClean="0"/>
-              <a:t>21.04.2024</a:t>
+              <a:t>01.05.2024</a:t>
             </a:fld>
             <a:endParaRPr lang="de-DE"/>
           </a:p>
@@ -11472,7 +11472,7 @@
           <a:p>
             <a:fld id="{3C5A5924-177F-4E13-8F18-BF17D897E27B}" type="datetime1">
               <a:rPr lang="de-DE" smtClean="0"/>
-              <a:t>21.04.2024</a:t>
+              <a:t>01.05.2024</a:t>
             </a:fld>
             <a:endParaRPr lang="de-DE"/>
           </a:p>
@@ -11741,7 +11741,7 @@
           <a:p>
             <a:fld id="{3C5A5924-177F-4E13-8F18-BF17D897E27B}" type="datetime1">
               <a:rPr lang="de-DE" smtClean="0"/>
-              <a:t>21.04.2024</a:t>
+              <a:t>01.05.2024</a:t>
             </a:fld>
             <a:endParaRPr lang="de-DE"/>
           </a:p>
@@ -11856,7 +11856,7 @@
           <a:p>
             <a:fld id="{5B1852AE-BE14-403F-948A-24D6C5188DC7}" type="datetime1">
               <a:rPr lang="de-DE" smtClean="0"/>
-              <a:t>21.04.2024</a:t>
+              <a:t>01.05.2024</a:t>
             </a:fld>
             <a:endParaRPr lang="de-DE"/>
           </a:p>
@@ -12084,7 +12084,7 @@
           <a:p>
             <a:fld id="{3C5A5924-177F-4E13-8F18-BF17D897E27B}" type="datetime1">
               <a:rPr lang="de-DE" smtClean="0"/>
-              <a:t>21.04.2024</a:t>
+              <a:t>01.05.2024</a:t>
             </a:fld>
             <a:endParaRPr lang="de-DE"/>
           </a:p>
@@ -12380,7 +12380,7 @@
           <a:p>
             <a:fld id="{3C5A5924-177F-4E13-8F18-BF17D897E27B}" type="datetime1">
               <a:rPr lang="de-DE" smtClean="0"/>
-              <a:t>21.04.2024</a:t>
+              <a:t>01.05.2024</a:t>
             </a:fld>
             <a:endParaRPr lang="de-DE"/>
           </a:p>
@@ -12667,7 +12667,7 @@
           <a:p>
             <a:fld id="{3C5A5924-177F-4E13-8F18-BF17D897E27B}" type="datetime1">
               <a:rPr lang="de-DE" smtClean="0"/>
-              <a:t>21.04.2024</a:t>
+              <a:t>01.05.2024</a:t>
             </a:fld>
             <a:endParaRPr lang="de-DE"/>
           </a:p>
@@ -12814,7 +12814,7 @@
           <a:p>
             <a:fld id="{3C5A5924-177F-4E13-8F18-BF17D897E27B}" type="datetime1">
               <a:rPr lang="de-DE" smtClean="0"/>
-              <a:t>21.04.2024</a:t>
+              <a:t>01.05.2024</a:t>
             </a:fld>
             <a:endParaRPr lang="de-DE"/>
           </a:p>
@@ -13181,7 +13181,7 @@
           <a:p>
             <a:fld id="{3C5A5924-177F-4E13-8F18-BF17D897E27B}" type="datetime1">
               <a:rPr lang="de-DE" smtClean="0"/>
-              <a:t>21.04.2024</a:t>
+              <a:t>01.05.2024</a:t>
             </a:fld>
             <a:endParaRPr lang="de-DE"/>
           </a:p>
@@ -13430,7 +13430,7 @@
           <a:p>
             <a:fld id="{3C5A5924-177F-4E13-8F18-BF17D897E27B}" type="datetime1">
               <a:rPr lang="de-DE" smtClean="0"/>
-              <a:t>21.04.2024</a:t>
+              <a:t>01.05.2024</a:t>
             </a:fld>
             <a:endParaRPr lang="de-DE"/>
           </a:p>
@@ -13776,7 +13776,7 @@
           <a:p>
             <a:fld id="{C02F5A9B-9FF8-41D7-88D9-F781DB264A7C}" type="datetime1">
               <a:rPr lang="de-DE" smtClean="0"/>
-              <a:t>21.04.2024</a:t>
+              <a:t>01.05.2024</a:t>
             </a:fld>
             <a:endParaRPr lang="de-DE"/>
           </a:p>
@@ -13957,7 +13957,7 @@
           <a:p>
             <a:fld id="{C02F5A9B-9FF8-41D7-88D9-F781DB264A7C}" type="datetime1">
               <a:rPr lang="de-DE" smtClean="0"/>
-              <a:t>21.04.2024</a:t>
+              <a:t>01.05.2024</a:t>
             </a:fld>
             <a:endParaRPr lang="de-DE"/>
           </a:p>
@@ -14307,7 +14307,7 @@
           <a:p>
             <a:fld id="{C02F5A9B-9FF8-41D7-88D9-F781DB264A7C}" type="datetime1">
               <a:rPr lang="de-DE" smtClean="0"/>
-              <a:t>21.04.2024</a:t>
+              <a:t>01.05.2024</a:t>
             </a:fld>
             <a:endParaRPr lang="de-DE"/>
           </a:p>
@@ -14594,7 +14594,7 @@
           <a:p>
             <a:fld id="{C02F5A9B-9FF8-41D7-88D9-F781DB264A7C}" type="datetime1">
               <a:rPr lang="de-DE" smtClean="0"/>
-              <a:t>21.04.2024</a:t>
+              <a:t>01.05.2024</a:t>
             </a:fld>
             <a:endParaRPr lang="de-DE"/>
           </a:p>
@@ -14741,7 +14741,7 @@
           <a:p>
             <a:fld id="{5B1852AE-BE14-403F-948A-24D6C5188DC7}" type="datetime1">
               <a:rPr lang="de-DE" smtClean="0"/>
-              <a:t>21.04.2024</a:t>
+              <a:t>01.05.2024</a:t>
             </a:fld>
             <a:endParaRPr lang="de-DE"/>
           </a:p>
@@ -14892,7 +14892,7 @@
           <a:p>
             <a:fld id="{C02F5A9B-9FF8-41D7-88D9-F781DB264A7C}" type="datetime1">
               <a:rPr lang="de-DE" smtClean="0"/>
-              <a:t>21.04.2024</a:t>
+              <a:t>01.05.2024</a:t>
             </a:fld>
             <a:endParaRPr lang="de-DE"/>
           </a:p>
@@ -15055,7 +15055,7 @@
           <a:p>
             <a:fld id="{C02F5A9B-9FF8-41D7-88D9-F781DB264A7C}" type="datetime1">
               <a:rPr lang="de-DE" smtClean="0"/>
-              <a:t>21.04.2024</a:t>
+              <a:t>01.05.2024</a:t>
             </a:fld>
             <a:endParaRPr lang="de-DE"/>
           </a:p>
@@ -15285,7 +15285,7 @@
           <a:p>
             <a:fld id="{C02F5A9B-9FF8-41D7-88D9-F781DB264A7C}" type="datetime1">
               <a:rPr lang="de-DE" smtClean="0"/>
-              <a:t>21.04.2024</a:t>
+              <a:t>01.05.2024</a:t>
             </a:fld>
             <a:endParaRPr lang="de-DE"/>
           </a:p>
@@ -15562,7 +15562,7 @@
           <a:p>
             <a:fld id="{C02F5A9B-9FF8-41D7-88D9-F781DB264A7C}" type="datetime1">
               <a:rPr lang="de-DE" smtClean="0"/>
-              <a:t>21.04.2024</a:t>
+              <a:t>01.05.2024</a:t>
             </a:fld>
             <a:endParaRPr lang="de-DE"/>
           </a:p>
@@ -15734,7 +15734,7 @@
           <a:p>
             <a:fld id="{C02F5A9B-9FF8-41D7-88D9-F781DB264A7C}" type="datetime1">
               <a:rPr lang="de-DE" smtClean="0"/>
-              <a:t>21.04.2024</a:t>
+              <a:t>01.05.2024</a:t>
             </a:fld>
             <a:endParaRPr lang="de-DE"/>
           </a:p>
@@ -15853,7 +15853,7 @@
           <a:p>
             <a:fld id="{C02F5A9B-9FF8-41D7-88D9-F781DB264A7C}" type="datetime1">
               <a:rPr lang="de-DE" smtClean="0"/>
-              <a:t>21.04.2024</a:t>
+              <a:t>01.05.2024</a:t>
             </a:fld>
             <a:endParaRPr lang="de-DE"/>
           </a:p>
@@ -16002,7 +16002,7 @@
           <a:p>
             <a:fld id="{C02F5A9B-9FF8-41D7-88D9-F781DB264A7C}" type="datetime1">
               <a:rPr lang="de-DE" smtClean="0"/>
-              <a:t>21.04.2024</a:t>
+              <a:t>01.05.2024</a:t>
             </a:fld>
             <a:endParaRPr lang="de-DE"/>
           </a:p>
@@ -16242,7 +16242,7 @@
           <a:p>
             <a:fld id="{C02F5A9B-9FF8-41D7-88D9-F781DB264A7C}" type="datetime1">
               <a:rPr lang="de-DE" smtClean="0"/>
-              <a:t>21.04.2024</a:t>
+              <a:t>01.05.2024</a:t>
             </a:fld>
             <a:endParaRPr lang="de-DE"/>
           </a:p>
@@ -16482,7 +16482,7 @@
           <a:p>
             <a:fld id="{C02F5A9B-9FF8-41D7-88D9-F781DB264A7C}" type="datetime1">
               <a:rPr lang="de-DE" smtClean="0"/>
-              <a:t>21.04.2024</a:t>
+              <a:t>01.05.2024</a:t>
             </a:fld>
             <a:endParaRPr lang="de-DE"/>
           </a:p>
@@ -16722,7 +16722,7 @@
           <a:p>
             <a:fld id="{C02F5A9B-9FF8-41D7-88D9-F781DB264A7C}" type="datetime1">
               <a:rPr lang="de-DE" smtClean="0"/>
-              <a:t>21.04.2024</a:t>
+              <a:t>01.05.2024</a:t>
             </a:fld>
             <a:endParaRPr lang="de-DE"/>
           </a:p>
@@ -17000,7 +17000,7 @@
           <a:p>
             <a:fld id="{5B1852AE-BE14-403F-948A-24D6C5188DC7}" type="datetime1">
               <a:rPr lang="de-DE" smtClean="0"/>
-              <a:t>21.04.2024</a:t>
+              <a:t>01.05.2024</a:t>
             </a:fld>
             <a:endParaRPr lang="de-DE"/>
           </a:p>
@@ -17119,7 +17119,7 @@
           <a:p>
             <a:fld id="{C02F5A9B-9FF8-41D7-88D9-F781DB264A7C}" type="datetime1">
               <a:rPr lang="de-DE" smtClean="0"/>
-              <a:t>21.04.2024</a:t>
+              <a:t>01.05.2024</a:t>
             </a:fld>
             <a:endParaRPr lang="de-DE"/>
           </a:p>
@@ -17369,7 +17369,7 @@
           <a:p>
             <a:fld id="{3156570E-7EF3-4182-BA9D-2A52B45C241A}" type="datetime1">
               <a:rPr lang="de-DE" smtClean="0"/>
-              <a:t>21.04.2024</a:t>
+              <a:t>01.05.2024</a:t>
             </a:fld>
             <a:endParaRPr lang="de-DE"/>
           </a:p>
@@ -17518,7 +17518,7 @@
           <a:p>
             <a:fld id="{3156570E-7EF3-4182-BA9D-2A52B45C241A}" type="datetime1">
               <a:rPr lang="de-DE" smtClean="0"/>
-              <a:t>21.04.2024</a:t>
+              <a:t>01.05.2024</a:t>
             </a:fld>
             <a:endParaRPr lang="de-DE"/>
           </a:p>
@@ -17758,7 +17758,7 @@
           <a:p>
             <a:fld id="{3156570E-7EF3-4182-BA9D-2A52B45C241A}" type="datetime1">
               <a:rPr lang="de-DE" smtClean="0"/>
-              <a:t>21.04.2024</a:t>
+              <a:t>01.05.2024</a:t>
             </a:fld>
             <a:endParaRPr lang="de-DE"/>
           </a:p>
@@ -17998,7 +17998,7 @@
           <a:p>
             <a:fld id="{3156570E-7EF3-4182-BA9D-2A52B45C241A}" type="datetime1">
               <a:rPr lang="de-DE" smtClean="0"/>
-              <a:t>21.04.2024</a:t>
+              <a:t>01.05.2024</a:t>
             </a:fld>
             <a:endParaRPr lang="de-DE"/>
           </a:p>
@@ -18270,7 +18270,7 @@
           <a:p>
             <a:fld id="{3156570E-7EF3-4182-BA9D-2A52B45C241A}" type="datetime1">
               <a:rPr lang="de-DE" smtClean="0"/>
-              <a:t>21.04.2024</a:t>
+              <a:t>01.05.2024</a:t>
             </a:fld>
             <a:endParaRPr lang="de-DE"/>
           </a:p>
@@ -18624,7 +18624,7 @@
           <a:p>
             <a:fld id="{3156570E-7EF3-4182-BA9D-2A52B45C241A}" type="datetime1">
               <a:rPr lang="de-DE" smtClean="0"/>
-              <a:t>21.04.2024</a:t>
+              <a:t>01.05.2024</a:t>
             </a:fld>
             <a:endParaRPr lang="de-DE"/>
           </a:p>
@@ -18836,7 +18836,7 @@
           <a:p>
             <a:fld id="{3156570E-7EF3-4182-BA9D-2A52B45C241A}" type="datetime1">
               <a:rPr lang="de-DE" smtClean="0"/>
-              <a:t>21.04.2024</a:t>
+              <a:t>01.05.2024</a:t>
             </a:fld>
             <a:endParaRPr lang="de-DE"/>
           </a:p>
@@ -19100,7 +19100,7 @@
             <a:r>
               <a:rPr lang="de-DE" dirty="0">
                 <a:solidFill>
-                  <a:srgbClr val="7030A0"/>
+                  <a:srgbClr val="BF00FF"/>
                 </a:solidFill>
                 <a:sym typeface="Wingdings" panose="05000000000000000000" pitchFamily="2" charset="2"/>
               </a:rPr>
@@ -19146,7 +19146,7 @@
           <a:p>
             <a:fld id="{3156570E-7EF3-4182-BA9D-2A52B45C241A}" type="datetime1">
               <a:rPr lang="de-DE" smtClean="0"/>
-              <a:t>21.04.2024</a:t>
+              <a:t>01.05.2024</a:t>
             </a:fld>
             <a:endParaRPr lang="de-DE"/>
           </a:p>
@@ -19404,7 +19404,7 @@
           <a:p>
             <a:fld id="{3156570E-7EF3-4182-BA9D-2A52B45C241A}" type="datetime1">
               <a:rPr lang="de-DE" smtClean="0"/>
-              <a:t>21.04.2024</a:t>
+              <a:t>01.05.2024</a:t>
             </a:fld>
             <a:endParaRPr lang="de-DE"/>
           </a:p>
@@ -19571,7 +19571,7 @@
           <a:p>
             <a:fld id="{5B1852AE-BE14-403F-948A-24D6C5188DC7}" type="datetime1">
               <a:rPr lang="de-DE" smtClean="0"/>
-              <a:t>21.04.2024</a:t>
+              <a:t>01.05.2024</a:t>
             </a:fld>
             <a:endParaRPr lang="de-DE"/>
           </a:p>
@@ -19866,7 +19866,7 @@
           <a:p>
             <a:fld id="{3156570E-7EF3-4182-BA9D-2A52B45C241A}" type="datetime1">
               <a:rPr lang="de-DE" smtClean="0"/>
-              <a:t>21.04.2024</a:t>
+              <a:t>01.05.2024</a:t>
             </a:fld>
             <a:endParaRPr lang="de-DE"/>
           </a:p>
@@ -20100,7 +20100,7 @@
           <a:p>
             <a:fld id="{3156570E-7EF3-4182-BA9D-2A52B45C241A}" type="datetime1">
               <a:rPr lang="de-DE" smtClean="0"/>
-              <a:t>21.04.2024</a:t>
+              <a:t>01.05.2024</a:t>
             </a:fld>
             <a:endParaRPr lang="de-DE"/>
           </a:p>
@@ -20277,7 +20277,7 @@
           <a:p>
             <a:fld id="{5B1852AE-BE14-403F-948A-24D6C5188DC7}" type="datetime1">
               <a:rPr lang="de-DE" smtClean="0"/>
-              <a:t>21.04.2024</a:t>
+              <a:t>01.05.2024</a:t>
             </a:fld>
             <a:endParaRPr lang="de-DE"/>
           </a:p>
@@ -20428,7 +20428,7 @@
           <a:p>
             <a:fld id="{3C5A5924-177F-4E13-8F18-BF17D897E27B}" type="datetime1">
               <a:rPr lang="de-DE" smtClean="0"/>
-              <a:t>21.04.2024</a:t>
+              <a:t>01.05.2024</a:t>
             </a:fld>
             <a:endParaRPr lang="de-DE"/>
           </a:p>
@@ -20589,7 +20589,7 @@
           <a:p>
             <a:fld id="{3C5A5924-177F-4E13-8F18-BF17D897E27B}" type="datetime1">
               <a:rPr lang="de-DE" smtClean="0"/>
-              <a:t>21.04.2024</a:t>
+              <a:t>01.05.2024</a:t>
             </a:fld>
             <a:endParaRPr lang="de-DE"/>
           </a:p>
@@ -20790,7 +20790,7 @@
           <a:p>
             <a:fld id="{3C5A5924-177F-4E13-8F18-BF17D897E27B}" type="datetime1">
               <a:rPr lang="de-DE" smtClean="0"/>
-              <a:t>21.04.2024</a:t>
+              <a:t>01.05.2024</a:t>
             </a:fld>
             <a:endParaRPr lang="de-DE"/>
           </a:p>

</xml_diff>